<commit_message>
Boolean Algebra & KMap
</commit_message>
<xml_diff>
--- a/GATE/Digital Logic 4%/PYQ.pptx
+++ b/GATE/Digital Logic 4%/PYQ.pptx
@@ -6,21 +6,22 @@
   </p:sldMasterIdLst>
   <p:sldIdLst>
     <p:sldId id="256" r:id="rId2"/>
-    <p:sldId id="257" r:id="rId3"/>
-    <p:sldId id="258" r:id="rId4"/>
-    <p:sldId id="259" r:id="rId5"/>
-    <p:sldId id="270" r:id="rId6"/>
-    <p:sldId id="260" r:id="rId7"/>
-    <p:sldId id="261" r:id="rId8"/>
-    <p:sldId id="262" r:id="rId9"/>
-    <p:sldId id="271" r:id="rId10"/>
-    <p:sldId id="263" r:id="rId11"/>
-    <p:sldId id="264" r:id="rId12"/>
-    <p:sldId id="265" r:id="rId13"/>
-    <p:sldId id="266" r:id="rId14"/>
-    <p:sldId id="267" r:id="rId15"/>
-    <p:sldId id="268" r:id="rId16"/>
-    <p:sldId id="269" r:id="rId17"/>
+    <p:sldId id="272" r:id="rId3"/>
+    <p:sldId id="257" r:id="rId4"/>
+    <p:sldId id="258" r:id="rId5"/>
+    <p:sldId id="259" r:id="rId6"/>
+    <p:sldId id="270" r:id="rId7"/>
+    <p:sldId id="260" r:id="rId8"/>
+    <p:sldId id="261" r:id="rId9"/>
+    <p:sldId id="262" r:id="rId10"/>
+    <p:sldId id="271" r:id="rId11"/>
+    <p:sldId id="263" r:id="rId12"/>
+    <p:sldId id="264" r:id="rId13"/>
+    <p:sldId id="265" r:id="rId14"/>
+    <p:sldId id="266" r:id="rId15"/>
+    <p:sldId id="267" r:id="rId16"/>
+    <p:sldId id="268" r:id="rId17"/>
+    <p:sldId id="269" r:id="rId18"/>
   </p:sldIdLst>
   <p:sldSz cx="12192000" cy="6858000"/>
   <p:notesSz cx="6858000" cy="9144000"/>
@@ -119,6 +120,44 @@
       </a:defRPr>
     </a:lvl9pPr>
   </p:defaultTextStyle>
+  <p:extLst>
+    <p:ext uri="{521415D9-36F7-43E2-AB2F-B90AF26B5E84}">
+      <p14:sectionLst xmlns:p14="http://schemas.microsoft.com/office/powerpoint/2010/main">
+        <p14:section name="Default Section" id="{D637536F-18FC-4B18-A3D3-1B9842B1926C}">
+          <p14:sldIdLst>
+            <p14:sldId id="256"/>
+          </p14:sldIdLst>
+        </p14:section>
+        <p14:section name="GATE 2025" id="{312BD75B-849C-4D1F-887F-527B204ABDDC}">
+          <p14:sldIdLst>
+            <p14:sldId id="272"/>
+          </p14:sldIdLst>
+        </p14:section>
+        <p14:section name="GATE 2022" id="{6E5B2E64-098E-4C8B-9FC8-4806AB304A70}">
+          <p14:sldIdLst>
+            <p14:sldId id="257"/>
+            <p14:sldId id="258"/>
+            <p14:sldId id="259"/>
+            <p14:sldId id="270"/>
+            <p14:sldId id="260"/>
+            <p14:sldId id="261"/>
+            <p14:sldId id="262"/>
+            <p14:sldId id="271"/>
+            <p14:sldId id="263"/>
+            <p14:sldId id="264"/>
+            <p14:sldId id="265"/>
+            <p14:sldId id="266"/>
+            <p14:sldId id="267"/>
+            <p14:sldId id="268"/>
+            <p14:sldId id="269"/>
+          </p14:sldIdLst>
+        </p14:section>
+      </p14:sectionLst>
+    </p:ext>
+    <p:ext uri="{EFAFB233-063F-42B5-8137-9DF3F51BA10A}">
+      <p15:sldGuideLst xmlns:p15="http://schemas.microsoft.com/office/powerpoint/2012/main"/>
+    </p:ext>
+  </p:extLst>
 </p:presentation>
 </file>
 
@@ -271,7 +310,7 @@
           <a:p>
             <a:fld id="{DE2E84A4-BEF0-4190-ADA9-27B82FD60D81}" type="datetimeFigureOut">
               <a:rPr lang="en-IN" smtClean="0"/>
-              <a:t>22-12-2025</a:t>
+              <a:t>02-02-2026</a:t>
             </a:fld>
             <a:endParaRPr lang="en-IN"/>
           </a:p>
@@ -471,7 +510,7 @@
           <a:p>
             <a:fld id="{DE2E84A4-BEF0-4190-ADA9-27B82FD60D81}" type="datetimeFigureOut">
               <a:rPr lang="en-IN" smtClean="0"/>
-              <a:t>22-12-2025</a:t>
+              <a:t>02-02-2026</a:t>
             </a:fld>
             <a:endParaRPr lang="en-IN"/>
           </a:p>
@@ -681,7 +720,7 @@
           <a:p>
             <a:fld id="{DE2E84A4-BEF0-4190-ADA9-27B82FD60D81}" type="datetimeFigureOut">
               <a:rPr lang="en-IN" smtClean="0"/>
-              <a:t>22-12-2025</a:t>
+              <a:t>02-02-2026</a:t>
             </a:fld>
             <a:endParaRPr lang="en-IN"/>
           </a:p>
@@ -881,7 +920,7 @@
           <a:p>
             <a:fld id="{DE2E84A4-BEF0-4190-ADA9-27B82FD60D81}" type="datetimeFigureOut">
               <a:rPr lang="en-IN" smtClean="0"/>
-              <a:t>22-12-2025</a:t>
+              <a:t>02-02-2026</a:t>
             </a:fld>
             <a:endParaRPr lang="en-IN"/>
           </a:p>
@@ -1157,7 +1196,7 @@
           <a:p>
             <a:fld id="{DE2E84A4-BEF0-4190-ADA9-27B82FD60D81}" type="datetimeFigureOut">
               <a:rPr lang="en-IN" smtClean="0"/>
-              <a:t>22-12-2025</a:t>
+              <a:t>02-02-2026</a:t>
             </a:fld>
             <a:endParaRPr lang="en-IN"/>
           </a:p>
@@ -1425,7 +1464,7 @@
           <a:p>
             <a:fld id="{DE2E84A4-BEF0-4190-ADA9-27B82FD60D81}" type="datetimeFigureOut">
               <a:rPr lang="en-IN" smtClean="0"/>
-              <a:t>22-12-2025</a:t>
+              <a:t>02-02-2026</a:t>
             </a:fld>
             <a:endParaRPr lang="en-IN"/>
           </a:p>
@@ -1840,7 +1879,7 @@
           <a:p>
             <a:fld id="{DE2E84A4-BEF0-4190-ADA9-27B82FD60D81}" type="datetimeFigureOut">
               <a:rPr lang="en-IN" smtClean="0"/>
-              <a:t>22-12-2025</a:t>
+              <a:t>02-02-2026</a:t>
             </a:fld>
             <a:endParaRPr lang="en-IN"/>
           </a:p>
@@ -1982,7 +2021,7 @@
           <a:p>
             <a:fld id="{DE2E84A4-BEF0-4190-ADA9-27B82FD60D81}" type="datetimeFigureOut">
               <a:rPr lang="en-IN" smtClean="0"/>
-              <a:t>22-12-2025</a:t>
+              <a:t>02-02-2026</a:t>
             </a:fld>
             <a:endParaRPr lang="en-IN"/>
           </a:p>
@@ -2095,7 +2134,7 @@
           <a:p>
             <a:fld id="{DE2E84A4-BEF0-4190-ADA9-27B82FD60D81}" type="datetimeFigureOut">
               <a:rPr lang="en-IN" smtClean="0"/>
-              <a:t>22-12-2025</a:t>
+              <a:t>02-02-2026</a:t>
             </a:fld>
             <a:endParaRPr lang="en-IN"/>
           </a:p>
@@ -2408,7 +2447,7 @@
           <a:p>
             <a:fld id="{DE2E84A4-BEF0-4190-ADA9-27B82FD60D81}" type="datetimeFigureOut">
               <a:rPr lang="en-IN" smtClean="0"/>
-              <a:t>22-12-2025</a:t>
+              <a:t>02-02-2026</a:t>
             </a:fld>
             <a:endParaRPr lang="en-IN"/>
           </a:p>
@@ -2697,7 +2736,7 @@
           <a:p>
             <a:fld id="{DE2E84A4-BEF0-4190-ADA9-27B82FD60D81}" type="datetimeFigureOut">
               <a:rPr lang="en-IN" smtClean="0"/>
-              <a:t>22-12-2025</a:t>
+              <a:t>02-02-2026</a:t>
             </a:fld>
             <a:endParaRPr lang="en-IN"/>
           </a:p>
@@ -2940,7 +2979,7 @@
           <a:p>
             <a:fld id="{DE2E84A4-BEF0-4190-ADA9-27B82FD60D81}" type="datetimeFigureOut">
               <a:rPr lang="en-IN" smtClean="0"/>
-              <a:t>22-12-2025</a:t>
+              <a:t>02-02-2026</a:t>
             </a:fld>
             <a:endParaRPr lang="en-IN"/>
           </a:p>
@@ -3437,10 +3476,59 @@
           <a:chExt cx="0" cy="0"/>
         </a:xfrm>
       </p:grpSpPr>
+      <p:sp>
+        <p:nvSpPr>
+          <p:cNvPr id="3" name="TextBox 2">
+            <a:extLst>
+              <a:ext uri="{FF2B5EF4-FFF2-40B4-BE49-F238E27FC236}">
+                <a16:creationId xmlns:a16="http://schemas.microsoft.com/office/drawing/2014/main" id="{98781475-BB52-4B46-AA1C-5A4F01E2C8F9}"/>
+              </a:ext>
+            </a:extLst>
+          </p:cNvPr>
+          <p:cNvSpPr txBox="1"/>
+          <p:nvPr/>
+        </p:nvSpPr>
+        <p:spPr>
+          <a:xfrm>
+            <a:off x="4678052" y="3075057"/>
+            <a:ext cx="3268744" cy="1323439"/>
+          </a:xfrm>
+          <a:prstGeom prst="rect">
+            <a:avLst/>
+          </a:prstGeom>
+          <a:noFill/>
+        </p:spPr>
+        <p:txBody>
+          <a:bodyPr wrap="square">
+            <a:spAutoFit/>
+          </a:bodyPr>
+          <a:lstStyle/>
+          <a:p>
+            <a:r>
+              <a:rPr lang="en-IN" sz="4000" b="1" dirty="0">
+                <a:solidFill>
+                  <a:srgbClr val="FF0000"/>
+                </a:solidFill>
+              </a:rPr>
+              <a:t>GATE 2021</a:t>
+            </a:r>
+          </a:p>
+          <a:p>
+            <a:r>
+              <a:rPr lang="en-IN" sz="4000" b="1" dirty="0">
+                <a:solidFill>
+                  <a:srgbClr val="FF0000"/>
+                </a:solidFill>
+              </a:rPr>
+              <a:t>Shift 01</a:t>
+            </a:r>
+          </a:p>
+        </p:txBody>
+      </p:sp>
     </p:spTree>
     <p:extLst>
       <p:ext uri="{BB962C8B-B14F-4D97-AF65-F5344CB8AC3E}">
-        <p14:creationId xmlns:p14="http://schemas.microsoft.com/office/powerpoint/2010/main" val="792997557"/>
+        <p14:creationId xmlns:p14="http://schemas.microsoft.com/office/powerpoint/2010/main" val="1507189941"/>
       </p:ext>
     </p:extLst>
   </p:cSld>
@@ -3470,7 +3558,7 @@
     </p:spTree>
     <p:extLst>
       <p:ext uri="{BB962C8B-B14F-4D97-AF65-F5344CB8AC3E}">
-        <p14:creationId xmlns:p14="http://schemas.microsoft.com/office/powerpoint/2010/main" val="4083562014"/>
+        <p14:creationId xmlns:p14="http://schemas.microsoft.com/office/powerpoint/2010/main" val="792997557"/>
       </p:ext>
     </p:extLst>
   </p:cSld>
@@ -3500,7 +3588,7 @@
     </p:spTree>
     <p:extLst>
       <p:ext uri="{BB962C8B-B14F-4D97-AF65-F5344CB8AC3E}">
-        <p14:creationId xmlns:p14="http://schemas.microsoft.com/office/powerpoint/2010/main" val="245893969"/>
+        <p14:creationId xmlns:p14="http://schemas.microsoft.com/office/powerpoint/2010/main" val="4083562014"/>
       </p:ext>
     </p:extLst>
   </p:cSld>
@@ -3530,7 +3618,7 @@
     </p:spTree>
     <p:extLst>
       <p:ext uri="{BB962C8B-B14F-4D97-AF65-F5344CB8AC3E}">
-        <p14:creationId xmlns:p14="http://schemas.microsoft.com/office/powerpoint/2010/main" val="1425128108"/>
+        <p14:creationId xmlns:p14="http://schemas.microsoft.com/office/powerpoint/2010/main" val="245893969"/>
       </p:ext>
     </p:extLst>
   </p:cSld>
@@ -3560,7 +3648,7 @@
     </p:spTree>
     <p:extLst>
       <p:ext uri="{BB962C8B-B14F-4D97-AF65-F5344CB8AC3E}">
-        <p14:creationId xmlns:p14="http://schemas.microsoft.com/office/powerpoint/2010/main" val="4241917714"/>
+        <p14:creationId xmlns:p14="http://schemas.microsoft.com/office/powerpoint/2010/main" val="1425128108"/>
       </p:ext>
     </p:extLst>
   </p:cSld>
@@ -3590,6 +3678,36 @@
     </p:spTree>
     <p:extLst>
       <p:ext uri="{BB962C8B-B14F-4D97-AF65-F5344CB8AC3E}">
+        <p14:creationId xmlns:p14="http://schemas.microsoft.com/office/powerpoint/2010/main" val="4241917714"/>
+      </p:ext>
+    </p:extLst>
+  </p:cSld>
+  <p:clrMapOvr>
+    <a:masterClrMapping/>
+  </p:clrMapOvr>
+</p:sld>
+</file>
+
+<file path=ppt/slides/slide16.xml><?xml version="1.0" encoding="utf-8"?>
+<p:sld xmlns:a="http://schemas.openxmlformats.org/drawingml/2006/main" xmlns:r="http://schemas.openxmlformats.org/officeDocument/2006/relationships" xmlns:p="http://schemas.openxmlformats.org/presentationml/2006/main">
+  <p:cSld>
+    <p:spTree>
+      <p:nvGrpSpPr>
+        <p:cNvPr id="1" name=""/>
+        <p:cNvGrpSpPr/>
+        <p:nvPr/>
+      </p:nvGrpSpPr>
+      <p:grpSpPr>
+        <a:xfrm>
+          <a:off x="0" y="0"/>
+          <a:ext cx="0" cy="0"/>
+          <a:chOff x="0" y="0"/>
+          <a:chExt cx="0" cy="0"/>
+        </a:xfrm>
+      </p:grpSpPr>
+    </p:spTree>
+    <p:extLst>
+      <p:ext uri="{BB962C8B-B14F-4D97-AF65-F5344CB8AC3E}">
         <p14:creationId xmlns:p14="http://schemas.microsoft.com/office/powerpoint/2010/main" val="2222708333"/>
       </p:ext>
     </p:extLst>
@@ -3600,7 +3718,7 @@
 </p:sld>
 </file>
 
-<file path=ppt/slides/slide16.xml><?xml version="1.0" encoding="utf-8"?>
+<file path=ppt/slides/slide17.xml><?xml version="1.0" encoding="utf-8"?>
 <p:sld xmlns:a="http://schemas.openxmlformats.org/drawingml/2006/main" xmlns:r="http://schemas.openxmlformats.org/officeDocument/2006/relationships" xmlns:p="http://schemas.openxmlformats.org/presentationml/2006/main">
   <p:cSld>
     <p:spTree>
@@ -3681,6 +3799,75 @@
                   <a:srgbClr val="FF0000"/>
                 </a:solidFill>
               </a:rPr>
+              <a:t>GATE 2025 02</a:t>
+            </a:r>
+          </a:p>
+        </p:txBody>
+      </p:sp>
+    </p:spTree>
+    <p:extLst>
+      <p:ext uri="{BB962C8B-B14F-4D97-AF65-F5344CB8AC3E}">
+        <p14:creationId xmlns:p14="http://schemas.microsoft.com/office/powerpoint/2010/main" val="3631942405"/>
+      </p:ext>
+    </p:extLst>
+  </p:cSld>
+  <p:clrMapOvr>
+    <a:masterClrMapping/>
+  </p:clrMapOvr>
+</p:sld>
+</file>
+
+<file path=ppt/slides/slide3.xml><?xml version="1.0" encoding="utf-8"?>
+<p:sld xmlns:a="http://schemas.openxmlformats.org/drawingml/2006/main" xmlns:r="http://schemas.openxmlformats.org/officeDocument/2006/relationships" xmlns:p="http://schemas.openxmlformats.org/presentationml/2006/main">
+  <p:cSld>
+    <p:spTree>
+      <p:nvGrpSpPr>
+        <p:cNvPr id="1" name=""/>
+        <p:cNvGrpSpPr/>
+        <p:nvPr/>
+      </p:nvGrpSpPr>
+      <p:grpSpPr>
+        <a:xfrm>
+          <a:off x="0" y="0"/>
+          <a:ext cx="0" cy="0"/>
+          <a:chOff x="0" y="0"/>
+          <a:chExt cx="0" cy="0"/>
+        </a:xfrm>
+      </p:grpSpPr>
+      <p:sp>
+        <p:nvSpPr>
+          <p:cNvPr id="3" name="TextBox 2">
+            <a:extLst>
+              <a:ext uri="{FF2B5EF4-FFF2-40B4-BE49-F238E27FC236}">
+                <a16:creationId xmlns:a16="http://schemas.microsoft.com/office/drawing/2014/main" id="{98781475-BB52-4B46-AA1C-5A4F01E2C8F9}"/>
+              </a:ext>
+            </a:extLst>
+          </p:cNvPr>
+          <p:cNvSpPr txBox="1"/>
+          <p:nvPr/>
+        </p:nvSpPr>
+        <p:spPr>
+          <a:xfrm>
+            <a:off x="4678052" y="3075057"/>
+            <a:ext cx="6094428" cy="707886"/>
+          </a:xfrm>
+          <a:prstGeom prst="rect">
+            <a:avLst/>
+          </a:prstGeom>
+          <a:noFill/>
+        </p:spPr>
+        <p:txBody>
+          <a:bodyPr wrap="square">
+            <a:spAutoFit/>
+          </a:bodyPr>
+          <a:lstStyle/>
+          <a:p>
+            <a:r>
+              <a:rPr lang="en-IN" sz="4000" b="1" dirty="0">
+                <a:solidFill>
+                  <a:srgbClr val="FF0000"/>
+                </a:solidFill>
+              </a:rPr>
               <a:t>GATE 2022</a:t>
             </a:r>
           </a:p>
@@ -3699,7 +3886,7 @@
 </p:sld>
 </file>
 
-<file path=ppt/slides/slide3.xml><?xml version="1.0" encoding="utf-8"?>
+<file path=ppt/slides/slide4.xml><?xml version="1.0" encoding="utf-8"?>
 <p:sld xmlns:a="http://schemas.openxmlformats.org/drawingml/2006/main" xmlns:r="http://schemas.openxmlformats.org/officeDocument/2006/relationships" xmlns:p="http://schemas.openxmlformats.org/presentationml/2006/main">
   <p:cSld>
     <p:spTree>
@@ -3789,7 +3976,7 @@
 </p:sld>
 </file>
 
-<file path=ppt/slides/slide4.xml><?xml version="1.0" encoding="utf-8"?>
+<file path=ppt/slides/slide5.xml><?xml version="1.0" encoding="utf-8"?>
 <p:sld xmlns:a="http://schemas.openxmlformats.org/drawingml/2006/main" xmlns:r="http://schemas.openxmlformats.org/officeDocument/2006/relationships" xmlns:p="http://schemas.openxmlformats.org/presentationml/2006/main">
   <p:cSld>
     <p:spTree>
@@ -3879,7 +4066,7 @@
 </p:sld>
 </file>
 
-<file path=ppt/slides/slide5.xml><?xml version="1.0" encoding="utf-8"?>
+<file path=ppt/slides/slide6.xml><?xml version="1.0" encoding="utf-8"?>
 <p:sld xmlns:a="http://schemas.openxmlformats.org/drawingml/2006/main" xmlns:r="http://schemas.openxmlformats.org/officeDocument/2006/relationships" xmlns:p="http://schemas.openxmlformats.org/presentationml/2006/main">
   <p:cSld>
     <p:spTree>
@@ -3981,7 +4168,7 @@
 </p:sld>
 </file>
 
-<file path=ppt/slides/slide6.xml><?xml version="1.0" encoding="utf-8"?>
+<file path=ppt/slides/slide7.xml><?xml version="1.0" encoding="utf-8"?>
 <p:sld xmlns:a="http://schemas.openxmlformats.org/drawingml/2006/main" xmlns:r="http://schemas.openxmlformats.org/officeDocument/2006/relationships" xmlns:p="http://schemas.openxmlformats.org/presentationml/2006/main">
   <p:cSld>
     <p:spTree>
@@ -4071,7 +4258,7 @@
 </p:sld>
 </file>
 
-<file path=ppt/slides/slide7.xml><?xml version="1.0" encoding="utf-8"?>
+<file path=ppt/slides/slide8.xml><?xml version="1.0" encoding="utf-8"?>
 <p:sld xmlns:a="http://schemas.openxmlformats.org/drawingml/2006/main" xmlns:r="http://schemas.openxmlformats.org/officeDocument/2006/relationships" xmlns:p="http://schemas.openxmlformats.org/presentationml/2006/main">
   <p:cSld>
     <p:spTree>
@@ -4161,7 +4348,7 @@
 </p:sld>
 </file>
 
-<file path=ppt/slides/slide8.xml><?xml version="1.0" encoding="utf-8"?>
+<file path=ppt/slides/slide9.xml><?xml version="1.0" encoding="utf-8"?>
 <p:sld xmlns:a="http://schemas.openxmlformats.org/drawingml/2006/main" xmlns:r="http://schemas.openxmlformats.org/officeDocument/2006/relationships" xmlns:p="http://schemas.openxmlformats.org/presentationml/2006/main">
   <p:cSld>
     <p:spTree>
@@ -4212,85 +4399,6 @@
     <p:extLst>
       <p:ext uri="{BB962C8B-B14F-4D97-AF65-F5344CB8AC3E}">
         <p14:creationId xmlns:p14="http://schemas.microsoft.com/office/powerpoint/2010/main" val="598988752"/>
-      </p:ext>
-    </p:extLst>
-  </p:cSld>
-  <p:clrMapOvr>
-    <a:masterClrMapping/>
-  </p:clrMapOvr>
-</p:sld>
-</file>
-
-<file path=ppt/slides/slide9.xml><?xml version="1.0" encoding="utf-8"?>
-<p:sld xmlns:a="http://schemas.openxmlformats.org/drawingml/2006/main" xmlns:r="http://schemas.openxmlformats.org/officeDocument/2006/relationships" xmlns:p="http://schemas.openxmlformats.org/presentationml/2006/main">
-  <p:cSld>
-    <p:spTree>
-      <p:nvGrpSpPr>
-        <p:cNvPr id="1" name=""/>
-        <p:cNvGrpSpPr/>
-        <p:nvPr/>
-      </p:nvGrpSpPr>
-      <p:grpSpPr>
-        <a:xfrm>
-          <a:off x="0" y="0"/>
-          <a:ext cx="0" cy="0"/>
-          <a:chOff x="0" y="0"/>
-          <a:chExt cx="0" cy="0"/>
-        </a:xfrm>
-      </p:grpSpPr>
-      <p:sp>
-        <p:nvSpPr>
-          <p:cNvPr id="3" name="TextBox 2">
-            <a:extLst>
-              <a:ext uri="{FF2B5EF4-FFF2-40B4-BE49-F238E27FC236}">
-                <a16:creationId xmlns:a16="http://schemas.microsoft.com/office/drawing/2014/main" id="{98781475-BB52-4B46-AA1C-5A4F01E2C8F9}"/>
-              </a:ext>
-            </a:extLst>
-          </p:cNvPr>
-          <p:cNvSpPr txBox="1"/>
-          <p:nvPr/>
-        </p:nvSpPr>
-        <p:spPr>
-          <a:xfrm>
-            <a:off x="4678052" y="3075057"/>
-            <a:ext cx="3268744" cy="1323439"/>
-          </a:xfrm>
-          <a:prstGeom prst="rect">
-            <a:avLst/>
-          </a:prstGeom>
-          <a:noFill/>
-        </p:spPr>
-        <p:txBody>
-          <a:bodyPr wrap="square">
-            <a:spAutoFit/>
-          </a:bodyPr>
-          <a:lstStyle/>
-          <a:p>
-            <a:r>
-              <a:rPr lang="en-IN" sz="4000" b="1" dirty="0">
-                <a:solidFill>
-                  <a:srgbClr val="FF0000"/>
-                </a:solidFill>
-              </a:rPr>
-              <a:t>GATE 2021</a:t>
-            </a:r>
-          </a:p>
-          <a:p>
-            <a:r>
-              <a:rPr lang="en-IN" sz="4000" b="1" dirty="0">
-                <a:solidFill>
-                  <a:srgbClr val="FF0000"/>
-                </a:solidFill>
-              </a:rPr>
-              <a:t>Shift 01</a:t>
-            </a:r>
-          </a:p>
-        </p:txBody>
-      </p:sp>
-    </p:spTree>
-    <p:extLst>
-      <p:ext uri="{BB962C8B-B14F-4D97-AF65-F5344CB8AC3E}">
-        <p14:creationId xmlns:p14="http://schemas.microsoft.com/office/powerpoint/2010/main" val="1507189941"/>
       </p:ext>
     </p:extLst>
   </p:cSld>

</xml_diff>